<commit_message>
class06: fixed some typos.
</commit_message>
<xml_diff>
--- a/talks/src/class06.pptx
+++ b/talks/src/class06.pptx
@@ -252,7 +252,7 @@
           <a:p>
             <a:fld id="{56C6788E-680A-49E5-BB93-D456A9D23A29}" type="datetimeFigureOut">
               <a:rPr lang="ru-RU" smtClean="0"/>
-              <a:t>22.11.2024</a:t>
+              <a:t>28.11.2025</a:t>
             </a:fld>
             <a:endParaRPr lang="ru-RU"/>
           </a:p>
@@ -421,7 +421,7 @@
           <a:p>
             <a:fld id="{C4DF4945-C160-4CD5-B124-49B9BE14C0AB}" type="datetimeFigureOut">
               <a:rPr lang="ru-RU" smtClean="0"/>
-              <a:t>22.11.2024</a:t>
+              <a:t>27.11.2025</a:t>
             </a:fld>
             <a:endParaRPr lang="ru-RU"/>
           </a:p>
@@ -6075,7 +6075,7 @@
           <a:p>
             <a:fld id="{12C63722-5D9F-4E99-9720-9B6A0C7BB1C9}" type="datetimeFigureOut">
               <a:rPr lang="ru-RU" smtClean="0"/>
-              <a:t>22.11.2024</a:t>
+              <a:t>27.11.2025</a:t>
             </a:fld>
             <a:endParaRPr lang="ru-RU"/>
           </a:p>
@@ -6245,7 +6245,7 @@
           <a:p>
             <a:fld id="{12C63722-5D9F-4E99-9720-9B6A0C7BB1C9}" type="datetimeFigureOut">
               <a:rPr lang="ru-RU" smtClean="0"/>
-              <a:t>22.11.2024</a:t>
+              <a:t>27.11.2025</a:t>
             </a:fld>
             <a:endParaRPr lang="ru-RU"/>
           </a:p>
@@ -6425,7 +6425,7 @@
           <a:p>
             <a:fld id="{12C63722-5D9F-4E99-9720-9B6A0C7BB1C9}" type="datetimeFigureOut">
               <a:rPr lang="ru-RU" smtClean="0"/>
-              <a:t>22.11.2024</a:t>
+              <a:t>27.11.2025</a:t>
             </a:fld>
             <a:endParaRPr lang="ru-RU"/>
           </a:p>
@@ -6617,7 +6617,7 @@
           <a:p>
             <a:fld id="{8C218C88-2408-4CFC-B25C-07450930B282}" type="datetimeFigureOut">
               <a:rPr lang="ru-RU" smtClean="0"/>
-              <a:t>22.11.2024</a:t>
+              <a:t>27.11.2025</a:t>
             </a:fld>
             <a:endParaRPr lang="ru-RU"/>
           </a:p>
@@ -6787,7 +6787,7 @@
           <a:p>
             <a:fld id="{8C218C88-2408-4CFC-B25C-07450930B282}" type="datetimeFigureOut">
               <a:rPr lang="ru-RU" smtClean="0"/>
-              <a:t>22.11.2024</a:t>
+              <a:t>27.11.2025</a:t>
             </a:fld>
             <a:endParaRPr lang="ru-RU"/>
           </a:p>
@@ -7033,7 +7033,7 @@
           <a:p>
             <a:fld id="{8C218C88-2408-4CFC-B25C-07450930B282}" type="datetimeFigureOut">
               <a:rPr lang="ru-RU" smtClean="0"/>
-              <a:t>22.11.2024</a:t>
+              <a:t>27.11.2025</a:t>
             </a:fld>
             <a:endParaRPr lang="ru-RU"/>
           </a:p>
@@ -7265,7 +7265,7 @@
           <a:p>
             <a:fld id="{8C218C88-2408-4CFC-B25C-07450930B282}" type="datetimeFigureOut">
               <a:rPr lang="ru-RU" smtClean="0"/>
-              <a:t>22.11.2024</a:t>
+              <a:t>27.11.2025</a:t>
             </a:fld>
             <a:endParaRPr lang="ru-RU"/>
           </a:p>
@@ -7632,7 +7632,7 @@
           <a:p>
             <a:fld id="{8C218C88-2408-4CFC-B25C-07450930B282}" type="datetimeFigureOut">
               <a:rPr lang="ru-RU" smtClean="0"/>
-              <a:t>22.11.2024</a:t>
+              <a:t>27.11.2025</a:t>
             </a:fld>
             <a:endParaRPr lang="ru-RU"/>
           </a:p>
@@ -7750,7 +7750,7 @@
           <a:p>
             <a:fld id="{8C218C88-2408-4CFC-B25C-07450930B282}" type="datetimeFigureOut">
               <a:rPr lang="ru-RU" smtClean="0"/>
-              <a:t>22.11.2024</a:t>
+              <a:t>27.11.2025</a:t>
             </a:fld>
             <a:endParaRPr lang="ru-RU"/>
           </a:p>
@@ -7845,7 +7845,7 @@
           <a:p>
             <a:fld id="{8C218C88-2408-4CFC-B25C-07450930B282}" type="datetimeFigureOut">
               <a:rPr lang="ru-RU" smtClean="0"/>
-              <a:t>22.11.2024</a:t>
+              <a:t>27.11.2025</a:t>
             </a:fld>
             <a:endParaRPr lang="ru-RU"/>
           </a:p>
@@ -8122,7 +8122,7 @@
           <a:p>
             <a:fld id="{8C218C88-2408-4CFC-B25C-07450930B282}" type="datetimeFigureOut">
               <a:rPr lang="ru-RU" smtClean="0"/>
-              <a:t>22.11.2024</a:t>
+              <a:t>27.11.2025</a:t>
             </a:fld>
             <a:endParaRPr lang="ru-RU"/>
           </a:p>
@@ -8292,7 +8292,7 @@
           <a:p>
             <a:fld id="{12C63722-5D9F-4E99-9720-9B6A0C7BB1C9}" type="datetimeFigureOut">
               <a:rPr lang="ru-RU" smtClean="0"/>
-              <a:t>22.11.2024</a:t>
+              <a:t>27.11.2025</a:t>
             </a:fld>
             <a:endParaRPr lang="ru-RU"/>
           </a:p>
@@ -8545,7 +8545,7 @@
           <a:p>
             <a:fld id="{8C218C88-2408-4CFC-B25C-07450930B282}" type="datetimeFigureOut">
               <a:rPr lang="ru-RU" smtClean="0"/>
-              <a:t>22.11.2024</a:t>
+              <a:t>27.11.2025</a:t>
             </a:fld>
             <a:endParaRPr lang="ru-RU"/>
           </a:p>
@@ -8715,7 +8715,7 @@
           <a:p>
             <a:fld id="{8C218C88-2408-4CFC-B25C-07450930B282}" type="datetimeFigureOut">
               <a:rPr lang="ru-RU" smtClean="0"/>
-              <a:t>22.11.2024</a:t>
+              <a:t>27.11.2025</a:t>
             </a:fld>
             <a:endParaRPr lang="ru-RU"/>
           </a:p>
@@ -8895,7 +8895,7 @@
           <a:p>
             <a:fld id="{8C218C88-2408-4CFC-B25C-07450930B282}" type="datetimeFigureOut">
               <a:rPr lang="ru-RU" smtClean="0"/>
-              <a:t>22.11.2024</a:t>
+              <a:t>27.11.2025</a:t>
             </a:fld>
             <a:endParaRPr lang="ru-RU"/>
           </a:p>
@@ -9141,7 +9141,7 @@
           <a:p>
             <a:fld id="{12C63722-5D9F-4E99-9720-9B6A0C7BB1C9}" type="datetimeFigureOut">
               <a:rPr lang="ru-RU" smtClean="0"/>
-              <a:t>22.11.2024</a:t>
+              <a:t>27.11.2025</a:t>
             </a:fld>
             <a:endParaRPr lang="ru-RU"/>
           </a:p>
@@ -9381,7 +9381,7 @@
           <a:p>
             <a:fld id="{12C63722-5D9F-4E99-9720-9B6A0C7BB1C9}" type="datetimeFigureOut">
               <a:rPr lang="ru-RU" smtClean="0"/>
-              <a:t>22.11.2024</a:t>
+              <a:t>27.11.2025</a:t>
             </a:fld>
             <a:endParaRPr lang="ru-RU"/>
           </a:p>
@@ -9748,7 +9748,7 @@
           <a:p>
             <a:fld id="{12C63722-5D9F-4E99-9720-9B6A0C7BB1C9}" type="datetimeFigureOut">
               <a:rPr lang="ru-RU" smtClean="0"/>
-              <a:t>22.11.2024</a:t>
+              <a:t>27.11.2025</a:t>
             </a:fld>
             <a:endParaRPr lang="ru-RU"/>
           </a:p>
@@ -9866,7 +9866,7 @@
           <a:p>
             <a:fld id="{12C63722-5D9F-4E99-9720-9B6A0C7BB1C9}" type="datetimeFigureOut">
               <a:rPr lang="ru-RU" smtClean="0"/>
-              <a:t>22.11.2024</a:t>
+              <a:t>27.11.2025</a:t>
             </a:fld>
             <a:endParaRPr lang="ru-RU"/>
           </a:p>
@@ -9961,7 +9961,7 @@
           <a:p>
             <a:fld id="{12C63722-5D9F-4E99-9720-9B6A0C7BB1C9}" type="datetimeFigureOut">
               <a:rPr lang="ru-RU" smtClean="0"/>
-              <a:t>22.11.2024</a:t>
+              <a:t>27.11.2025</a:t>
             </a:fld>
             <a:endParaRPr lang="ru-RU"/>
           </a:p>
@@ -10238,7 +10238,7 @@
           <a:p>
             <a:fld id="{12C63722-5D9F-4E99-9720-9B6A0C7BB1C9}" type="datetimeFigureOut">
               <a:rPr lang="ru-RU" smtClean="0"/>
-              <a:t>22.11.2024</a:t>
+              <a:t>27.11.2025</a:t>
             </a:fld>
             <a:endParaRPr lang="ru-RU"/>
           </a:p>
@@ -10491,7 +10491,7 @@
           <a:p>
             <a:fld id="{12C63722-5D9F-4E99-9720-9B6A0C7BB1C9}" type="datetimeFigureOut">
               <a:rPr lang="ru-RU" smtClean="0"/>
-              <a:t>22.11.2024</a:t>
+              <a:t>27.11.2025</a:t>
             </a:fld>
             <a:endParaRPr lang="ru-RU"/>
           </a:p>
@@ -10704,7 +10704,7 @@
           <a:p>
             <a:fld id="{12C63722-5D9F-4E99-9720-9B6A0C7BB1C9}" type="datetimeFigureOut">
               <a:rPr lang="ru-RU" smtClean="0"/>
-              <a:t>22.11.2024</a:t>
+              <a:t>27.11.2025</a:t>
             </a:fld>
             <a:endParaRPr lang="ru-RU"/>
           </a:p>
@@ -11244,7 +11244,7 @@
           <a:p>
             <a:fld id="{8C218C88-2408-4CFC-B25C-07450930B282}" type="datetimeFigureOut">
               <a:rPr lang="ru-RU" smtClean="0"/>
-              <a:t>22.11.2024</a:t>
+              <a:t>27.11.2025</a:t>
             </a:fld>
             <a:endParaRPr lang="ru-RU"/>
           </a:p>
@@ -25380,7 +25380,7 @@
           <p:nvPr>
             <p:extLst>
               <p:ext uri="{D42A27DB-BD31-4B8C-83A1-F6EECF244321}">
-                <p14:modId xmlns:p14="http://schemas.microsoft.com/office/powerpoint/2010/main" val="1783070367"/>
+                <p14:modId xmlns:p14="http://schemas.microsoft.com/office/powerpoint/2010/main" val="511585720"/>
               </p:ext>
             </p:extLst>
           </p:nvPr>
@@ -25506,7 +25506,7 @@
                       </a:r>
                       <a:r>
                         <a:rPr lang="en-US" baseline="0" dirty="0"/>
-                        <a:t> + COW (ZFS).</a:t>
+                        <a:t> + copy-on-write (ZFS).</a:t>
                       </a:r>
                     </a:p>
                     <a:p>
@@ -38773,7 +38773,7 @@
           <p:nvPr>
             <p:extLst>
               <p:ext uri="{D42A27DB-BD31-4B8C-83A1-F6EECF244321}">
-                <p14:modId xmlns:p14="http://schemas.microsoft.com/office/powerpoint/2010/main" val="4271599832"/>
+                <p14:modId xmlns:p14="http://schemas.microsoft.com/office/powerpoint/2010/main" val="142513962"/>
               </p:ext>
             </p:extLst>
           </p:nvPr>
@@ -39093,11 +39093,7 @@
                       </a:pPr>
                       <a:r>
                         <a:rPr lang="en-US" dirty="0"/>
-                        <a:t>Online scrubbing &amp; repair </a:t>
-                      </a:r>
-                      <a:r>
-                        <a:rPr lang="ru-RU" dirty="0"/>
-                        <a:t>в</a:t>
+                        <a:t>Online scrubbing &amp; repair in</a:t>
                       </a:r>
                       <a:r>
                         <a:rPr lang="ru-RU" baseline="0" dirty="0"/>
@@ -39293,7 +39289,7 @@
           <p:nvPr>
             <p:extLst>
               <p:ext uri="{D42A27DB-BD31-4B8C-83A1-F6EECF244321}">
-                <p14:modId xmlns:p14="http://schemas.microsoft.com/office/powerpoint/2010/main" val="457818707"/>
+                <p14:modId xmlns:p14="http://schemas.microsoft.com/office/powerpoint/2010/main" val="1407484062"/>
               </p:ext>
             </p:extLst>
           </p:nvPr>
@@ -39613,11 +39609,7 @@
                       </a:pPr>
                       <a:r>
                         <a:rPr lang="en-US" dirty="0"/>
-                        <a:t>Online scrubbing &amp; repair </a:t>
-                      </a:r>
-                      <a:r>
-                        <a:rPr lang="ru-RU" dirty="0"/>
-                        <a:t>в</a:t>
+                        <a:t>Online scrubbing &amp; repair in</a:t>
                       </a:r>
                       <a:r>
                         <a:rPr lang="ru-RU" baseline="0" dirty="0"/>

</xml_diff>